<commit_message>
Domain checks refinement. Poster updates.
</commit_message>
<xml_diff>
--- a/Poster.pptx
+++ b/Poster.pptx
@@ -161,12 +161,12 @@
   <pc:docChgLst>
     <pc:chgData name="Daryl Quek" userId="f27e3362e4192b30" providerId="LiveId" clId="{EABF0CBF-A883-4410-8F6F-DAEAA6E8CC01}"/>
     <pc:docChg chg="undo custSel modSld">
-      <pc:chgData name="Daryl Quek" userId="f27e3362e4192b30" providerId="LiveId" clId="{EABF0CBF-A883-4410-8F6F-DAEAA6E8CC01}" dt="2018-11-24T15:18:44.997" v="884" actId="5793"/>
+      <pc:chgData name="Daryl Quek" userId="f27e3362e4192b30" providerId="LiveId" clId="{EABF0CBF-A883-4410-8F6F-DAEAA6E8CC01}" dt="2018-11-25T09:24:48.907" v="1209" actId="20577"/>
       <pc:docMkLst>
         <pc:docMk/>
       </pc:docMkLst>
       <pc:sldChg chg="addSp delSp modSp">
-        <pc:chgData name="Daryl Quek" userId="f27e3362e4192b30" providerId="LiveId" clId="{EABF0CBF-A883-4410-8F6F-DAEAA6E8CC01}" dt="2018-11-24T15:18:44.997" v="884" actId="5793"/>
+        <pc:chgData name="Daryl Quek" userId="f27e3362e4192b30" providerId="LiveId" clId="{EABF0CBF-A883-4410-8F6F-DAEAA6E8CC01}" dt="2018-11-25T09:24:48.907" v="1209" actId="20577"/>
         <pc:sldMkLst>
           <pc:docMk/>
           <pc:sldMk cId="0" sldId="256"/>
@@ -212,7 +212,7 @@
           </ac:spMkLst>
         </pc:spChg>
         <pc:graphicFrameChg chg="add mod modGraphic">
-          <ac:chgData name="Daryl Quek" userId="f27e3362e4192b30" providerId="LiveId" clId="{EABF0CBF-A883-4410-8F6F-DAEAA6E8CC01}" dt="2018-11-24T15:17:52.654" v="796" actId="20577"/>
+          <ac:chgData name="Daryl Quek" userId="f27e3362e4192b30" providerId="LiveId" clId="{EABF0CBF-A883-4410-8F6F-DAEAA6E8CC01}" dt="2018-11-25T09:24:48.907" v="1209" actId="20577"/>
           <ac:graphicFrameMkLst>
             <pc:docMk/>
             <pc:sldMk cId="0" sldId="256"/>
@@ -8783,14 +8783,14 @@
           <p:nvPr>
             <p:extLst>
               <p:ext uri="{D42A27DB-BD31-4B8C-83A1-F6EECF244321}">
-                <p14:modId xmlns:p14="http://schemas.microsoft.com/office/powerpoint/2010/main" val="3464913332"/>
+                <p14:modId xmlns:p14="http://schemas.microsoft.com/office/powerpoint/2010/main" val="329622840"/>
               </p:ext>
             </p:extLst>
           </p:nvPr>
         </p:nvGraphicFramePr>
         <p:xfrm>
           <a:off x="19633406" y="4275566"/>
-          <a:ext cx="9448800" cy="5737922"/>
+          <a:ext cx="9753600" cy="6177418"/>
         </p:xfrm>
         <a:graphic>
           <a:graphicData uri="http://schemas.openxmlformats.org/drawingml/2006/table">
@@ -8806,24 +8806,17 @@
                     </a:ext>
                   </a:extLst>
                 </a:gridCol>
-                <a:gridCol w="2362200">
+                <a:gridCol w="4343400">
                   <a:extLst>
                     <a:ext uri="{9D8B030D-6E8A-4147-A177-3AD203B41FA5}">
                       <a16:colId xmlns:a16="http://schemas.microsoft.com/office/drawing/2014/main" val="1017342635"/>
                     </a:ext>
                   </a:extLst>
                 </a:gridCol>
-                <a:gridCol w="2362200">
+                <a:gridCol w="3048000">
                   <a:extLst>
                     <a:ext uri="{9D8B030D-6E8A-4147-A177-3AD203B41FA5}">
-                      <a16:colId xmlns:a16="http://schemas.microsoft.com/office/drawing/2014/main" val="866945953"/>
-                    </a:ext>
-                  </a:extLst>
-                </a:gridCol>
-                <a:gridCol w="2362200">
-                  <a:extLst>
-                    <a:ext uri="{9D8B030D-6E8A-4147-A177-3AD203B41FA5}">
-                      <a16:colId xmlns:a16="http://schemas.microsoft.com/office/drawing/2014/main" val="1522043755"/>
+                      <a16:colId xmlns:a16="http://schemas.microsoft.com/office/drawing/2014/main" val="714126360"/>
                     </a:ext>
                   </a:extLst>
                 </a:gridCol>
@@ -8880,23 +8873,6 @@
                     </a:solidFill>
                   </a:tcPr>
                 </a:tc>
-                <a:tc>
-                  <a:txBody>
-                    <a:bodyPr/>
-                    <a:lstStyle/>
-                    <a:p>
-                      <a:r>
-                        <a:rPr lang="en-SG" sz="2000" dirty="0"/>
-                        <a:t>???</a:t>
-                      </a:r>
-                    </a:p>
-                  </a:txBody>
-                  <a:tcPr>
-                    <a:solidFill>
-                      <a:srgbClr val="345299"/>
-                    </a:solidFill>
-                  </a:tcPr>
-                </a:tc>
                 <a:extLst>
                   <a:ext uri="{0D108BD9-81ED-4DB2-BD59-A6C34878D82A}">
                     <a16:rowId xmlns:a16="http://schemas.microsoft.com/office/drawing/2014/main" val="1799610700"/>
@@ -8904,7 +8880,7 @@
                 </a:extLst>
               </a:tr>
               <a:tr h="398828">
-                <a:tc gridSpan="4">
+                <a:tc gridSpan="3">
                   <a:txBody>
                     <a:bodyPr/>
                     <a:lstStyle/>
@@ -8940,20 +8916,18 @@
                     <a:bodyPr/>
                     <a:lstStyle/>
                     <a:p>
-                      <a:endParaRPr lang="en-SG" dirty="0"/>
+                      <a:endParaRPr lang="en-SG" sz="2000" b="1" dirty="0">
+                        <a:solidFill>
+                          <a:schemeClr val="bg1"/>
+                        </a:solidFill>
+                      </a:endParaRPr>
                     </a:p>
                   </a:txBody>
-                  <a:tcPr/>
-                </a:tc>
-                <a:tc hMerge="1">
-                  <a:txBody>
-                    <a:bodyPr/>
-                    <a:lstStyle/>
-                    <a:p>
-                      <a:endParaRPr lang="en-SG" dirty="0"/>
-                    </a:p>
-                  </a:txBody>
-                  <a:tcPr/>
+                  <a:tcPr>
+                    <a:solidFill>
+                      <a:srgbClr val="345299"/>
+                    </a:solidFill>
+                  </a:tcPr>
                 </a:tc>
                 <a:extLst>
                   <a:ext uri="{0D108BD9-81ED-4DB2-BD59-A6C34878D82A}">
@@ -8967,7 +8941,23 @@
                     <a:bodyPr/>
                     <a:lstStyle/>
                     <a:p>
-                      <a:endParaRPr lang="en-SG" sz="2000" dirty="0"/>
+                      <a:r>
+                        <a:rPr lang="en-SG" sz="2000" dirty="0"/>
+                        <a:t>Domain Age</a:t>
+                      </a:r>
+                    </a:p>
+                  </a:txBody>
+                  <a:tcPr/>
+                </a:tc>
+                <a:tc>
+                  <a:txBody>
+                    <a:bodyPr/>
+                    <a:lstStyle/>
+                    <a:p>
+                      <a:r>
+                        <a:rPr lang="en-SG" sz="2000" dirty="0"/>
+                        <a:t>&gt; 1 month</a:t>
+                      </a:r>
                     </a:p>
                   </a:txBody>
                   <a:tcPr/>
@@ -8982,12 +8972,22 @@
                   </a:txBody>
                   <a:tcPr/>
                 </a:tc>
+                <a:extLst>
+                  <a:ext uri="{0D108BD9-81ED-4DB2-BD59-A6C34878D82A}">
+                    <a16:rowId xmlns:a16="http://schemas.microsoft.com/office/drawing/2014/main" val="812863633"/>
+                  </a:ext>
+                </a:extLst>
+              </a:tr>
+              <a:tr h="764547">
                 <a:tc>
                   <a:txBody>
                     <a:bodyPr/>
                     <a:lstStyle/>
                     <a:p>
-                      <a:endParaRPr lang="en-SG" sz="2000"/>
+                      <a:r>
+                        <a:rPr lang="en-SG" sz="2000" dirty="0"/>
+                        <a:t>Domain Expiry</a:t>
+                      </a:r>
                     </a:p>
                   </a:txBody>
                   <a:tcPr/>
@@ -8997,7 +8997,20 @@
                     <a:bodyPr/>
                     <a:lstStyle/>
                     <a:p>
-                      <a:endParaRPr lang="en-SG" sz="2000"/>
+                      <a:r>
+                        <a:rPr lang="en-SG" sz="2000" dirty="0"/>
+                        <a:t>&lt; 3 months</a:t>
+                      </a:r>
+                    </a:p>
+                  </a:txBody>
+                  <a:tcPr/>
+                </a:tc>
+                <a:tc>
+                  <a:txBody>
+                    <a:bodyPr/>
+                    <a:lstStyle/>
+                    <a:p>
+                      <a:endParaRPr lang="en-SG" sz="2000" dirty="0"/>
                     </a:p>
                   </a:txBody>
                   <a:tcPr/>
@@ -9008,8 +9021,51 @@
                   </a:ext>
                 </a:extLst>
               </a:tr>
+              <a:tr h="764547">
+                <a:tc>
+                  <a:txBody>
+                    <a:bodyPr/>
+                    <a:lstStyle/>
+                    <a:p>
+                      <a:r>
+                        <a:rPr lang="en-SG" sz="2000" dirty="0"/>
+                        <a:t>Registrant</a:t>
+                      </a:r>
+                    </a:p>
+                  </a:txBody>
+                  <a:tcPr/>
+                </a:tc>
+                <a:tc>
+                  <a:txBody>
+                    <a:bodyPr/>
+                    <a:lstStyle/>
+                    <a:p>
+                      <a:r>
+                        <a:rPr lang="en-SG" sz="2000" dirty="0"/>
+                        <a:t>Top Google search result for registrant must be a page registered by registrant</a:t>
+                      </a:r>
+                    </a:p>
+                  </a:txBody>
+                  <a:tcPr/>
+                </a:tc>
+                <a:tc>
+                  <a:txBody>
+                    <a:bodyPr/>
+                    <a:lstStyle/>
+                    <a:p>
+                      <a:endParaRPr lang="en-SG" sz="2000" dirty="0"/>
+                    </a:p>
+                  </a:txBody>
+                  <a:tcPr/>
+                </a:tc>
+                <a:extLst>
+                  <a:ext uri="{0D108BD9-81ED-4DB2-BD59-A6C34878D82A}">
+                    <a16:rowId xmlns:a16="http://schemas.microsoft.com/office/drawing/2014/main" val="287246157"/>
+                  </a:ext>
+                </a:extLst>
+              </a:tr>
               <a:tr h="299706">
-                <a:tc gridSpan="4">
+                <a:tc gridSpan="3">
                   <a:txBody>
                     <a:bodyPr/>
                     <a:lstStyle/>
@@ -9066,21 +9122,28 @@
                     <a:bodyPr/>
                     <a:lstStyle/>
                     <a:p>
-                      <a:endParaRPr lang="en-SG" dirty="0"/>
-                    </a:p>
-                  </a:txBody>
-                  <a:tcPr>
-                    <a:solidFill>
-                      <a:srgbClr val="345299"/>
-                    </a:solidFill>
-                  </a:tcPr>
-                </a:tc>
-                <a:tc hMerge="1">
-                  <a:txBody>
-                    <a:bodyPr/>
-                    <a:lstStyle/>
-                    <a:p>
-                      <a:endParaRPr lang="en-SG" dirty="0"/>
+                      <a:pPr marL="0" marR="0" lvl="0" indent="0" algn="l" defTabSz="615025" rtl="0" eaLnBrk="1" fontAlgn="auto" latinLnBrk="0" hangingPunct="1">
+                        <a:lnSpc>
+                          <a:spcPct val="100000"/>
+                        </a:lnSpc>
+                        <a:spcBef>
+                          <a:spcPts val="0"/>
+                        </a:spcBef>
+                        <a:spcAft>
+                          <a:spcPts val="0"/>
+                        </a:spcAft>
+                        <a:buClrTx/>
+                        <a:buSzTx/>
+                        <a:buFontTx/>
+                        <a:buNone/>
+                        <a:tabLst/>
+                        <a:defRPr/>
+                      </a:pPr>
+                      <a:endParaRPr lang="en-SG" sz="2000" b="1" dirty="0">
+                        <a:solidFill>
+                          <a:schemeClr val="bg1"/>
+                        </a:solidFill>
+                      </a:endParaRPr>
                     </a:p>
                   </a:txBody>
                   <a:tcPr>
@@ -9118,16 +9181,6 @@
                         <a:rPr lang="en-SG" sz="2000" dirty="0"/>
                         <a:t>+/- 10 ranks from possible identified original site</a:t>
                       </a:r>
-                    </a:p>
-                  </a:txBody>
-                  <a:tcPr/>
-                </a:tc>
-                <a:tc>
-                  <a:txBody>
-                    <a:bodyPr/>
-                    <a:lstStyle/>
-                    <a:p>
-                      <a:endParaRPr lang="en-SG" sz="2000" dirty="0"/>
                     </a:p>
                   </a:txBody>
                   <a:tcPr/>
@@ -9185,16 +9238,6 @@
                   </a:txBody>
                   <a:tcPr/>
                 </a:tc>
-                <a:tc>
-                  <a:txBody>
-                    <a:bodyPr/>
-                    <a:lstStyle/>
-                    <a:p>
-                      <a:endParaRPr lang="en-SG" sz="2000" dirty="0"/>
-                    </a:p>
-                  </a:txBody>
-                  <a:tcPr/>
-                </a:tc>
                 <a:extLst>
                   <a:ext uri="{0D108BD9-81ED-4DB2-BD59-A6C34878D82A}">
                     <a16:rowId xmlns:a16="http://schemas.microsoft.com/office/drawing/2014/main" val="616146629"/>
@@ -9202,7 +9245,7 @@
                 </a:extLst>
               </a:tr>
               <a:tr h="266679">
-                <a:tc gridSpan="4">
+                <a:tc gridSpan="3">
                   <a:txBody>
                     <a:bodyPr/>
                     <a:lstStyle/>
@@ -9255,20 +9298,35 @@
                     <a:bodyPr/>
                     <a:lstStyle/>
                     <a:p>
-                      <a:endParaRPr lang="en-SG" sz="2000" dirty="0"/>
+                      <a:pPr marL="0" marR="0" lvl="0" indent="0" algn="l" defTabSz="615025" rtl="0" eaLnBrk="1" fontAlgn="auto" latinLnBrk="0" hangingPunct="1">
+                        <a:lnSpc>
+                          <a:spcPct val="100000"/>
+                        </a:lnSpc>
+                        <a:spcBef>
+                          <a:spcPts val="0"/>
+                        </a:spcBef>
+                        <a:spcAft>
+                          <a:spcPts val="0"/>
+                        </a:spcAft>
+                        <a:buClrTx/>
+                        <a:buSzTx/>
+                        <a:buFontTx/>
+                        <a:buNone/>
+                        <a:tabLst/>
+                        <a:defRPr/>
+                      </a:pPr>
+                      <a:endParaRPr lang="en-SG" sz="2000" b="1" dirty="0">
+                        <a:solidFill>
+                          <a:schemeClr val="bg1"/>
+                        </a:solidFill>
+                      </a:endParaRPr>
                     </a:p>
                   </a:txBody>
-                  <a:tcPr/>
-                </a:tc>
-                <a:tc hMerge="1">
-                  <a:txBody>
-                    <a:bodyPr/>
-                    <a:lstStyle/>
-                    <a:p>
-                      <a:endParaRPr lang="en-SG" sz="2000" dirty="0"/>
-                    </a:p>
-                  </a:txBody>
-                  <a:tcPr/>
+                  <a:tcPr>
+                    <a:solidFill>
+                      <a:srgbClr val="345299"/>
+                    </a:solidFill>
+                  </a:tcPr>
                 </a:tc>
                 <a:extLst>
                   <a:ext uri="{0D108BD9-81ED-4DB2-BD59-A6C34878D82A}">
@@ -9282,17 +9340,11 @@
                     <a:bodyPr/>
                     <a:lstStyle/>
                     <a:p>
+                      <a:r>
+                        <a:rPr lang="en-SG" sz="2000"/>
+                        <a:t>Forms</a:t>
+                      </a:r>
                       <a:endParaRPr lang="en-SG" sz="2000" dirty="0"/>
-                    </a:p>
-                  </a:txBody>
-                  <a:tcPr/>
-                </a:tc>
-                <a:tc>
-                  <a:txBody>
-                    <a:bodyPr/>
-                    <a:lstStyle/>
-                    <a:p>
-                      <a:endParaRPr lang="en-SG" sz="2000"/>
                     </a:p>
                   </a:txBody>
                   <a:tcPr/>

</xml_diff>

<commit_message>
added new file domain_check.js to do changes and testing on domain checks
</commit_message>
<xml_diff>
--- a/Poster.pptx
+++ b/Poster.pptx
@@ -161,12 +161,12 @@
   <pc:docChgLst>
     <pc:chgData name="Daryl Quek" userId="f27e3362e4192b30" providerId="LiveId" clId="{EABF0CBF-A883-4410-8F6F-DAEAA6E8CC01}"/>
     <pc:docChg chg="undo custSel modSld">
-      <pc:chgData name="Daryl Quek" userId="f27e3362e4192b30" providerId="LiveId" clId="{EABF0CBF-A883-4410-8F6F-DAEAA6E8CC01}" dt="2018-11-24T15:18:44.997" v="884" actId="5793"/>
+      <pc:chgData name="Daryl Quek" userId="f27e3362e4192b30" providerId="LiveId" clId="{EABF0CBF-A883-4410-8F6F-DAEAA6E8CC01}" dt="2018-11-25T09:24:48.907" v="1209" actId="20577"/>
       <pc:docMkLst>
         <pc:docMk/>
       </pc:docMkLst>
       <pc:sldChg chg="addSp delSp modSp">
-        <pc:chgData name="Daryl Quek" userId="f27e3362e4192b30" providerId="LiveId" clId="{EABF0CBF-A883-4410-8F6F-DAEAA6E8CC01}" dt="2018-11-24T15:18:44.997" v="884" actId="5793"/>
+        <pc:chgData name="Daryl Quek" userId="f27e3362e4192b30" providerId="LiveId" clId="{EABF0CBF-A883-4410-8F6F-DAEAA6E8CC01}" dt="2018-11-25T09:24:48.907" v="1209" actId="20577"/>
         <pc:sldMkLst>
           <pc:docMk/>
           <pc:sldMk cId="0" sldId="256"/>
@@ -212,7 +212,7 @@
           </ac:spMkLst>
         </pc:spChg>
         <pc:graphicFrameChg chg="add mod modGraphic">
-          <ac:chgData name="Daryl Quek" userId="f27e3362e4192b30" providerId="LiveId" clId="{EABF0CBF-A883-4410-8F6F-DAEAA6E8CC01}" dt="2018-11-24T15:17:52.654" v="796" actId="20577"/>
+          <ac:chgData name="Daryl Quek" userId="f27e3362e4192b30" providerId="LiveId" clId="{EABF0CBF-A883-4410-8F6F-DAEAA6E8CC01}" dt="2018-11-25T09:24:48.907" v="1209" actId="20577"/>
           <ac:graphicFrameMkLst>
             <pc:docMk/>
             <pc:sldMk cId="0" sldId="256"/>
@@ -8783,14 +8783,14 @@
           <p:nvPr>
             <p:extLst>
               <p:ext uri="{D42A27DB-BD31-4B8C-83A1-F6EECF244321}">
-                <p14:modId xmlns:p14="http://schemas.microsoft.com/office/powerpoint/2010/main" val="3464913332"/>
+                <p14:modId xmlns:p14="http://schemas.microsoft.com/office/powerpoint/2010/main" val="329622840"/>
               </p:ext>
             </p:extLst>
           </p:nvPr>
         </p:nvGraphicFramePr>
         <p:xfrm>
           <a:off x="19633406" y="4275566"/>
-          <a:ext cx="9448800" cy="5737922"/>
+          <a:ext cx="9753600" cy="6177418"/>
         </p:xfrm>
         <a:graphic>
           <a:graphicData uri="http://schemas.openxmlformats.org/drawingml/2006/table">
@@ -8806,24 +8806,17 @@
                     </a:ext>
                   </a:extLst>
                 </a:gridCol>
-                <a:gridCol w="2362200">
+                <a:gridCol w="4343400">
                   <a:extLst>
                     <a:ext uri="{9D8B030D-6E8A-4147-A177-3AD203B41FA5}">
                       <a16:colId xmlns:a16="http://schemas.microsoft.com/office/drawing/2014/main" val="1017342635"/>
                     </a:ext>
                   </a:extLst>
                 </a:gridCol>
-                <a:gridCol w="2362200">
+                <a:gridCol w="3048000">
                   <a:extLst>
                     <a:ext uri="{9D8B030D-6E8A-4147-A177-3AD203B41FA5}">
-                      <a16:colId xmlns:a16="http://schemas.microsoft.com/office/drawing/2014/main" val="866945953"/>
-                    </a:ext>
-                  </a:extLst>
-                </a:gridCol>
-                <a:gridCol w="2362200">
-                  <a:extLst>
-                    <a:ext uri="{9D8B030D-6E8A-4147-A177-3AD203B41FA5}">
-                      <a16:colId xmlns:a16="http://schemas.microsoft.com/office/drawing/2014/main" val="1522043755"/>
+                      <a16:colId xmlns:a16="http://schemas.microsoft.com/office/drawing/2014/main" val="714126360"/>
                     </a:ext>
                   </a:extLst>
                 </a:gridCol>
@@ -8880,23 +8873,6 @@
                     </a:solidFill>
                   </a:tcPr>
                 </a:tc>
-                <a:tc>
-                  <a:txBody>
-                    <a:bodyPr/>
-                    <a:lstStyle/>
-                    <a:p>
-                      <a:r>
-                        <a:rPr lang="en-SG" sz="2000" dirty="0"/>
-                        <a:t>???</a:t>
-                      </a:r>
-                    </a:p>
-                  </a:txBody>
-                  <a:tcPr>
-                    <a:solidFill>
-                      <a:srgbClr val="345299"/>
-                    </a:solidFill>
-                  </a:tcPr>
-                </a:tc>
                 <a:extLst>
                   <a:ext uri="{0D108BD9-81ED-4DB2-BD59-A6C34878D82A}">
                     <a16:rowId xmlns:a16="http://schemas.microsoft.com/office/drawing/2014/main" val="1799610700"/>
@@ -8904,7 +8880,7 @@
                 </a:extLst>
               </a:tr>
               <a:tr h="398828">
-                <a:tc gridSpan="4">
+                <a:tc gridSpan="3">
                   <a:txBody>
                     <a:bodyPr/>
                     <a:lstStyle/>
@@ -8940,20 +8916,18 @@
                     <a:bodyPr/>
                     <a:lstStyle/>
                     <a:p>
-                      <a:endParaRPr lang="en-SG" dirty="0"/>
+                      <a:endParaRPr lang="en-SG" sz="2000" b="1" dirty="0">
+                        <a:solidFill>
+                          <a:schemeClr val="bg1"/>
+                        </a:solidFill>
+                      </a:endParaRPr>
                     </a:p>
                   </a:txBody>
-                  <a:tcPr/>
-                </a:tc>
-                <a:tc hMerge="1">
-                  <a:txBody>
-                    <a:bodyPr/>
-                    <a:lstStyle/>
-                    <a:p>
-                      <a:endParaRPr lang="en-SG" dirty="0"/>
-                    </a:p>
-                  </a:txBody>
-                  <a:tcPr/>
+                  <a:tcPr>
+                    <a:solidFill>
+                      <a:srgbClr val="345299"/>
+                    </a:solidFill>
+                  </a:tcPr>
                 </a:tc>
                 <a:extLst>
                   <a:ext uri="{0D108BD9-81ED-4DB2-BD59-A6C34878D82A}">
@@ -8967,7 +8941,23 @@
                     <a:bodyPr/>
                     <a:lstStyle/>
                     <a:p>
-                      <a:endParaRPr lang="en-SG" sz="2000" dirty="0"/>
+                      <a:r>
+                        <a:rPr lang="en-SG" sz="2000" dirty="0"/>
+                        <a:t>Domain Age</a:t>
+                      </a:r>
+                    </a:p>
+                  </a:txBody>
+                  <a:tcPr/>
+                </a:tc>
+                <a:tc>
+                  <a:txBody>
+                    <a:bodyPr/>
+                    <a:lstStyle/>
+                    <a:p>
+                      <a:r>
+                        <a:rPr lang="en-SG" sz="2000" dirty="0"/>
+                        <a:t>&gt; 1 month</a:t>
+                      </a:r>
                     </a:p>
                   </a:txBody>
                   <a:tcPr/>
@@ -8982,12 +8972,22 @@
                   </a:txBody>
                   <a:tcPr/>
                 </a:tc>
+                <a:extLst>
+                  <a:ext uri="{0D108BD9-81ED-4DB2-BD59-A6C34878D82A}">
+                    <a16:rowId xmlns:a16="http://schemas.microsoft.com/office/drawing/2014/main" val="812863633"/>
+                  </a:ext>
+                </a:extLst>
+              </a:tr>
+              <a:tr h="764547">
                 <a:tc>
                   <a:txBody>
                     <a:bodyPr/>
                     <a:lstStyle/>
                     <a:p>
-                      <a:endParaRPr lang="en-SG" sz="2000"/>
+                      <a:r>
+                        <a:rPr lang="en-SG" sz="2000" dirty="0"/>
+                        <a:t>Domain Expiry</a:t>
+                      </a:r>
                     </a:p>
                   </a:txBody>
                   <a:tcPr/>
@@ -8997,7 +8997,20 @@
                     <a:bodyPr/>
                     <a:lstStyle/>
                     <a:p>
-                      <a:endParaRPr lang="en-SG" sz="2000"/>
+                      <a:r>
+                        <a:rPr lang="en-SG" sz="2000" dirty="0"/>
+                        <a:t>&lt; 3 months</a:t>
+                      </a:r>
+                    </a:p>
+                  </a:txBody>
+                  <a:tcPr/>
+                </a:tc>
+                <a:tc>
+                  <a:txBody>
+                    <a:bodyPr/>
+                    <a:lstStyle/>
+                    <a:p>
+                      <a:endParaRPr lang="en-SG" sz="2000" dirty="0"/>
                     </a:p>
                   </a:txBody>
                   <a:tcPr/>
@@ -9008,8 +9021,51 @@
                   </a:ext>
                 </a:extLst>
               </a:tr>
+              <a:tr h="764547">
+                <a:tc>
+                  <a:txBody>
+                    <a:bodyPr/>
+                    <a:lstStyle/>
+                    <a:p>
+                      <a:r>
+                        <a:rPr lang="en-SG" sz="2000" dirty="0"/>
+                        <a:t>Registrant</a:t>
+                      </a:r>
+                    </a:p>
+                  </a:txBody>
+                  <a:tcPr/>
+                </a:tc>
+                <a:tc>
+                  <a:txBody>
+                    <a:bodyPr/>
+                    <a:lstStyle/>
+                    <a:p>
+                      <a:r>
+                        <a:rPr lang="en-SG" sz="2000" dirty="0"/>
+                        <a:t>Top Google search result for registrant must be a page registered by registrant</a:t>
+                      </a:r>
+                    </a:p>
+                  </a:txBody>
+                  <a:tcPr/>
+                </a:tc>
+                <a:tc>
+                  <a:txBody>
+                    <a:bodyPr/>
+                    <a:lstStyle/>
+                    <a:p>
+                      <a:endParaRPr lang="en-SG" sz="2000" dirty="0"/>
+                    </a:p>
+                  </a:txBody>
+                  <a:tcPr/>
+                </a:tc>
+                <a:extLst>
+                  <a:ext uri="{0D108BD9-81ED-4DB2-BD59-A6C34878D82A}">
+                    <a16:rowId xmlns:a16="http://schemas.microsoft.com/office/drawing/2014/main" val="287246157"/>
+                  </a:ext>
+                </a:extLst>
+              </a:tr>
               <a:tr h="299706">
-                <a:tc gridSpan="4">
+                <a:tc gridSpan="3">
                   <a:txBody>
                     <a:bodyPr/>
                     <a:lstStyle/>
@@ -9066,21 +9122,28 @@
                     <a:bodyPr/>
                     <a:lstStyle/>
                     <a:p>
-                      <a:endParaRPr lang="en-SG" dirty="0"/>
-                    </a:p>
-                  </a:txBody>
-                  <a:tcPr>
-                    <a:solidFill>
-                      <a:srgbClr val="345299"/>
-                    </a:solidFill>
-                  </a:tcPr>
-                </a:tc>
-                <a:tc hMerge="1">
-                  <a:txBody>
-                    <a:bodyPr/>
-                    <a:lstStyle/>
-                    <a:p>
-                      <a:endParaRPr lang="en-SG" dirty="0"/>
+                      <a:pPr marL="0" marR="0" lvl="0" indent="0" algn="l" defTabSz="615025" rtl="0" eaLnBrk="1" fontAlgn="auto" latinLnBrk="0" hangingPunct="1">
+                        <a:lnSpc>
+                          <a:spcPct val="100000"/>
+                        </a:lnSpc>
+                        <a:spcBef>
+                          <a:spcPts val="0"/>
+                        </a:spcBef>
+                        <a:spcAft>
+                          <a:spcPts val="0"/>
+                        </a:spcAft>
+                        <a:buClrTx/>
+                        <a:buSzTx/>
+                        <a:buFontTx/>
+                        <a:buNone/>
+                        <a:tabLst/>
+                        <a:defRPr/>
+                      </a:pPr>
+                      <a:endParaRPr lang="en-SG" sz="2000" b="1" dirty="0">
+                        <a:solidFill>
+                          <a:schemeClr val="bg1"/>
+                        </a:solidFill>
+                      </a:endParaRPr>
                     </a:p>
                   </a:txBody>
                   <a:tcPr>
@@ -9118,16 +9181,6 @@
                         <a:rPr lang="en-SG" sz="2000" dirty="0"/>
                         <a:t>+/- 10 ranks from possible identified original site</a:t>
                       </a:r>
-                    </a:p>
-                  </a:txBody>
-                  <a:tcPr/>
-                </a:tc>
-                <a:tc>
-                  <a:txBody>
-                    <a:bodyPr/>
-                    <a:lstStyle/>
-                    <a:p>
-                      <a:endParaRPr lang="en-SG" sz="2000" dirty="0"/>
                     </a:p>
                   </a:txBody>
                   <a:tcPr/>
@@ -9185,16 +9238,6 @@
                   </a:txBody>
                   <a:tcPr/>
                 </a:tc>
-                <a:tc>
-                  <a:txBody>
-                    <a:bodyPr/>
-                    <a:lstStyle/>
-                    <a:p>
-                      <a:endParaRPr lang="en-SG" sz="2000" dirty="0"/>
-                    </a:p>
-                  </a:txBody>
-                  <a:tcPr/>
-                </a:tc>
                 <a:extLst>
                   <a:ext uri="{0D108BD9-81ED-4DB2-BD59-A6C34878D82A}">
                     <a16:rowId xmlns:a16="http://schemas.microsoft.com/office/drawing/2014/main" val="616146629"/>
@@ -9202,7 +9245,7 @@
                 </a:extLst>
               </a:tr>
               <a:tr h="266679">
-                <a:tc gridSpan="4">
+                <a:tc gridSpan="3">
                   <a:txBody>
                     <a:bodyPr/>
                     <a:lstStyle/>
@@ -9255,20 +9298,35 @@
                     <a:bodyPr/>
                     <a:lstStyle/>
                     <a:p>
-                      <a:endParaRPr lang="en-SG" sz="2000" dirty="0"/>
+                      <a:pPr marL="0" marR="0" lvl="0" indent="0" algn="l" defTabSz="615025" rtl="0" eaLnBrk="1" fontAlgn="auto" latinLnBrk="0" hangingPunct="1">
+                        <a:lnSpc>
+                          <a:spcPct val="100000"/>
+                        </a:lnSpc>
+                        <a:spcBef>
+                          <a:spcPts val="0"/>
+                        </a:spcBef>
+                        <a:spcAft>
+                          <a:spcPts val="0"/>
+                        </a:spcAft>
+                        <a:buClrTx/>
+                        <a:buSzTx/>
+                        <a:buFontTx/>
+                        <a:buNone/>
+                        <a:tabLst/>
+                        <a:defRPr/>
+                      </a:pPr>
+                      <a:endParaRPr lang="en-SG" sz="2000" b="1" dirty="0">
+                        <a:solidFill>
+                          <a:schemeClr val="bg1"/>
+                        </a:solidFill>
+                      </a:endParaRPr>
                     </a:p>
                   </a:txBody>
-                  <a:tcPr/>
-                </a:tc>
-                <a:tc hMerge="1">
-                  <a:txBody>
-                    <a:bodyPr/>
-                    <a:lstStyle/>
-                    <a:p>
-                      <a:endParaRPr lang="en-SG" sz="2000" dirty="0"/>
-                    </a:p>
-                  </a:txBody>
-                  <a:tcPr/>
+                  <a:tcPr>
+                    <a:solidFill>
+                      <a:srgbClr val="345299"/>
+                    </a:solidFill>
+                  </a:tcPr>
                 </a:tc>
                 <a:extLst>
                   <a:ext uri="{0D108BD9-81ED-4DB2-BD59-A6C34878D82A}">
@@ -9282,17 +9340,11 @@
                     <a:bodyPr/>
                     <a:lstStyle/>
                     <a:p>
+                      <a:r>
+                        <a:rPr lang="en-SG" sz="2000"/>
+                        <a:t>Forms</a:t>
+                      </a:r>
                       <a:endParaRPr lang="en-SG" sz="2000" dirty="0"/>
-                    </a:p>
-                  </a:txBody>
-                  <a:tcPr/>
-                </a:tc>
-                <a:tc>
-                  <a:txBody>
-                    <a:bodyPr/>
-                    <a:lstStyle/>
-                    <a:p>
-                      <a:endParaRPr lang="en-SG" sz="2000"/>
                     </a:p>
                   </a:txBody>
                   <a:tcPr/>

</xml_diff>